<commit_message>
Update description of Screening Assessments Profile [FHIR-39949],Change Header [FHIR-39950]
</commit_message>
<xml_diff>
--- a/input/images-source/5.0.1_SDOHAssessmentDiagrams_USCore_C-CDA.pptx
+++ b/input/images-source/5.0.1_SDOHAssessmentDiagrams_USCore_C-CDA.pptx
@@ -29956,8 +29956,8 @@
         </p:nvSpPr>
         <p:spPr>
           <a:xfrm>
-            <a:off x="292775" y="3314124"/>
-            <a:ext cx="1992900" cy="1626175"/>
+            <a:off x="225798" y="2809647"/>
+            <a:ext cx="1992900" cy="1362979"/>
           </a:xfrm>
           <a:prstGeom prst="rect">
             <a:avLst/>
@@ -29991,18 +29991,16 @@
               <a:buNone/>
             </a:pPr>
             <a:r>
-              <a:rPr lang="en-US" sz="1900" b="1" i="0" u="none" strike="noStrike" cap="none" dirty="0">
+              <a:rPr lang="en-US" sz="2000" b="0" i="0" dirty="0">
                 <a:solidFill>
-                  <a:schemeClr val="dk1"/>
+                  <a:srgbClr val="172B4D"/>
                 </a:solidFill>
-                <a:latin typeface="Calibri"/>
-                <a:ea typeface="Calibri"/>
-                <a:cs typeface="Calibri"/>
-                <a:sym typeface="Calibri"/>
+                <a:effectLst/>
+                <a:latin typeface="-apple-system"/>
               </a:rPr>
-              <a:t>US Core Observation Screening and Assessments Profile</a:t>
+              <a:t>US Core Observation Screening Assessment Profile</a:t>
             </a:r>
-            <a:endParaRPr lang="en-US" sz="1900" b="0" i="0" u="none" strike="noStrike" cap="none" dirty="0">
+            <a:endParaRPr lang="en-US" sz="2000" b="0" i="0" u="none" strike="noStrike" cap="none" dirty="0">
               <a:solidFill>
                 <a:srgbClr val="000000"/>
               </a:solidFill>

</xml_diff>